<commit_message>
内容更新　#3 #4 #5 #6 #7 #8 #9 #10 #11 に対応
#3 #4 #5 #6 #7 #8 #9 #10 #11 に対応
</commit_message>
<xml_diff>
--- a/Module-A-JPN-Motivation.pptx
+++ b/Module-A-JPN-Motivation.pptx
@@ -8579,6 +8579,10 @@
               <a:t>(</a:t>
             </a:r>
             <a:r>
+              <a:rPr lang="ja-JP" altLang="en-US" dirty="0"/>
+              <a:t> パーミッシブ</a:t>
+            </a:r>
+            <a:r>
               <a:rPr lang="ja-JP" altLang="en-US" sz="1600" b="0" strike="noStrike" spc="-1" dirty="0" smtClean="0">
                 <a:solidFill>
                   <a:srgbClr val="000000"/>
@@ -8586,7 +8590,17 @@
                 <a:latin typeface="Arial"/>
                 <a:ea typeface="Arial"/>
               </a:rPr>
-              <a:t>パーミティブでない</a:t>
+              <a:t>で</a:t>
+            </a:r>
+            <a:r>
+              <a:rPr lang="ja-JP" altLang="en-US" sz="1600" b="0" strike="noStrike" spc="-1" dirty="0" smtClean="0">
+                <a:solidFill>
+                  <a:srgbClr val="000000"/>
+                </a:solidFill>
+                <a:latin typeface="Arial"/>
+                <a:ea typeface="Arial"/>
+              </a:rPr>
+              <a:t>ない</a:t>
             </a:r>
             <a:r>
               <a:rPr lang="en-US" sz="1600" b="0" strike="noStrike" spc="-1" dirty="0" smtClean="0">
@@ -9213,6 +9227,110 @@
           </a:p>
         </p:txBody>
       </p:sp>
+      <p:sp>
+        <p:nvSpPr>
+          <p:cNvPr id="2" name="テキスト ボックス 1"/>
+          <p:cNvSpPr txBox="1"/>
+          <p:nvPr/>
+        </p:nvSpPr>
+        <p:spPr>
+          <a:xfrm>
+            <a:off x="7405140" y="1349115"/>
+            <a:ext cx="4247213" cy="2031325"/>
+          </a:xfrm>
+          <a:prstGeom prst="rect">
+            <a:avLst/>
+          </a:prstGeom>
+        </p:spPr>
+        <p:style>
+          <a:lnRef idx="2">
+            <a:schemeClr val="dk1"/>
+          </a:lnRef>
+          <a:fillRef idx="1">
+            <a:schemeClr val="lt1"/>
+          </a:fillRef>
+          <a:effectRef idx="0">
+            <a:schemeClr val="dk1"/>
+          </a:effectRef>
+          <a:fontRef idx="minor">
+            <a:schemeClr val="dk1"/>
+          </a:fontRef>
+        </p:style>
+        <p:txBody>
+          <a:bodyPr wrap="square" rtlCol="0">
+            <a:spAutoFit/>
+          </a:bodyPr>
+          <a:lstStyle/>
+          <a:p>
+            <a:r>
+              <a:rPr lang="ja-JP" altLang="en-US" dirty="0" smtClean="0"/>
+              <a:t>訳注：左例の補足説明</a:t>
+            </a:r>
+            <a:endParaRPr lang="en-US" altLang="ja-JP" dirty="0" smtClean="0"/>
+          </a:p>
+          <a:p>
+            <a:pPr marL="285750" indent="-285750">
+              <a:buFont typeface="Arial" panose="020B0604020202020204" pitchFamily="34" charset="0"/>
+              <a:buChar char="•"/>
+            </a:pPr>
+            <a:r>
+              <a:rPr lang="ja-JP" altLang="en-US" dirty="0" smtClean="0"/>
+              <a:t>文字</a:t>
+            </a:r>
+            <a:r>
+              <a:rPr lang="ja-JP" altLang="en-US" dirty="0"/>
+              <a:t>コードが書かれている </a:t>
+            </a:r>
+            <a:r>
+              <a:rPr lang="en-US" altLang="ja-JP" dirty="0"/>
+              <a:t>(u00A9)</a:t>
+            </a:r>
+          </a:p>
+          <a:p>
+            <a:pPr marL="285750" indent="-285750">
+              <a:buFont typeface="Arial" panose="020B0604020202020204" pitchFamily="34" charset="0"/>
+              <a:buChar char="•"/>
+            </a:pPr>
+            <a:r>
+              <a:rPr lang="ja-JP" altLang="en-US" dirty="0"/>
+              <a:t>文字化け</a:t>
+            </a:r>
+          </a:p>
+          <a:p>
+            <a:pPr marL="285750" indent="-285750">
+              <a:buFont typeface="Arial" panose="020B0604020202020204" pitchFamily="34" charset="0"/>
+              <a:buChar char="•"/>
+            </a:pPr>
+            <a:r>
+              <a:rPr lang="en-US" altLang="ja-JP" dirty="0"/>
+              <a:t>All Rights Reserved </a:t>
+            </a:r>
+            <a:r>
+              <a:rPr lang="ja-JP" altLang="en-US" dirty="0"/>
+              <a:t>とだけ書かれていてライセンスが不明 </a:t>
+            </a:r>
+            <a:r>
+              <a:rPr lang="en-US" altLang="ja-JP" dirty="0"/>
+              <a:t>(</a:t>
+            </a:r>
+            <a:r>
+              <a:rPr lang="ja-JP" altLang="en-US" dirty="0"/>
+              <a:t>オープンソースとして使えない</a:t>
+            </a:r>
+            <a:r>
+              <a:rPr lang="en-US" altLang="ja-JP" dirty="0"/>
+              <a:t>)</a:t>
+            </a:r>
+          </a:p>
+          <a:p>
+            <a:pPr marL="285750" indent="-285750">
+              <a:buFont typeface="Arial" panose="020B0604020202020204" pitchFamily="34" charset="0"/>
+              <a:buChar char="•"/>
+            </a:pPr>
+            <a:endParaRPr kumimoji="1" lang="ja-JP" altLang="en-US" dirty="0"/>
+          </a:p>
+        </p:txBody>
+      </p:sp>
     </p:spTree>
   </p:cSld>
   <p:clrMapOvr>
@@ -11267,8 +11385,8 @@
         </p:nvSpPr>
         <p:spPr>
           <a:xfrm>
-            <a:off x="838080" y="1825560"/>
-            <a:ext cx="6400080" cy="4350600"/>
+            <a:off x="405306" y="1882281"/>
+            <a:ext cx="7541421" cy="4350600"/>
           </a:xfrm>
           <a:prstGeom prst="rect">
             <a:avLst/>
@@ -11337,158 +11455,65 @@
               <a:buAutoNum type="arabicPeriod"/>
             </a:pPr>
             <a:r>
-              <a:rPr lang="ja-JP" altLang="en-US" sz="2400" b="1" spc="-1" dirty="0" smtClean="0">
-                <a:solidFill>
-                  <a:srgbClr val="000000"/>
-                </a:solidFill>
-                <a:latin typeface="ＭＳ ゴシック" panose="020B0609070205080204" pitchFamily="49" charset="-128"/>
-                <a:ea typeface="ＭＳ ゴシック" panose="020B0609070205080204" pitchFamily="49" charset="-128"/>
-              </a:rPr>
-              <a:t>コンポーネント分析 </a:t>
-            </a:r>
-            <a:r>
-              <a:rPr lang="en-US" sz="2400" b="1" strike="noStrike" spc="-1" dirty="0" smtClean="0">
-                <a:solidFill>
-                  <a:srgbClr val="000000"/>
-                </a:solidFill>
-                <a:latin typeface="ＭＳ ゴシック" panose="020B0609070205080204" pitchFamily="49" charset="-128"/>
-                <a:ea typeface="ＭＳ ゴシック" panose="020B0609070205080204" pitchFamily="49" charset="-128"/>
-              </a:rPr>
-              <a:t>vs</a:t>
-            </a:r>
-            <a:r>
-              <a:rPr lang="en-US" sz="2400" b="1" strike="noStrike" spc="-1" dirty="0">
-                <a:solidFill>
-                  <a:srgbClr val="000000"/>
-                </a:solidFill>
-                <a:latin typeface="ＭＳ ゴシック" panose="020B0609070205080204" pitchFamily="49" charset="-128"/>
-                <a:ea typeface="ＭＳ ゴシック" panose="020B0609070205080204" pitchFamily="49" charset="-128"/>
-              </a:rPr>
-              <a:t>. </a:t>
-            </a:r>
-            <a:r>
-              <a:rPr lang="ja-JP" altLang="en-US" sz="2400" b="1" spc="-1" dirty="0" smtClean="0">
-                <a:solidFill>
-                  <a:srgbClr val="000000"/>
-                </a:solidFill>
-                <a:latin typeface="ＭＳ ゴシック" panose="020B0609070205080204" pitchFamily="49" charset="-128"/>
-                <a:ea typeface="ＭＳ ゴシック" panose="020B0609070205080204" pitchFamily="49" charset="-128"/>
-              </a:rPr>
-              <a:t>利用法</a:t>
-            </a:r>
-            <a:r>
-              <a:rPr lang="ja-JP" altLang="en-US" sz="2400" b="1" spc="-1" dirty="0">
-                <a:solidFill>
-                  <a:srgbClr val="000000"/>
-                </a:solidFill>
-                <a:latin typeface="ＭＳ ゴシック" panose="020B0609070205080204" pitchFamily="49" charset="-128"/>
-                <a:ea typeface="ＭＳ ゴシック" panose="020B0609070205080204" pitchFamily="49" charset="-128"/>
-              </a:rPr>
-              <a:t>分析</a:t>
-            </a:r>
-            <a:endParaRPr lang="en-US" sz="2400" b="0" strike="noStrike" spc="-1" dirty="0">
-              <a:latin typeface="ＭＳ ゴシック" panose="020B0609070205080204" pitchFamily="49" charset="-128"/>
-              <a:ea typeface="ＭＳ ゴシック" panose="020B0609070205080204" pitchFamily="49" charset="-128"/>
-            </a:endParaRPr>
-          </a:p>
-          <a:p>
-            <a:pPr marL="522360" lvl="2" indent="-381960">
-              <a:lnSpc>
-                <a:spcPct val="100000"/>
-              </a:lnSpc>
-              <a:buClr>
-                <a:srgbClr val="3C464B"/>
-              </a:buClr>
-              <a:buFont typeface="Noto Sans Symbols"/>
-              <a:buAutoNum type="alphaLcParenR"/>
-            </a:pPr>
-            <a:r>
-              <a:rPr lang="ja-JP" altLang="en-US" sz="2400" b="0" strike="noStrike" spc="-1" dirty="0" smtClean="0">
-                <a:solidFill>
-                  <a:srgbClr val="000000"/>
-                </a:solidFill>
-                <a:latin typeface="ＭＳ ゴシック" panose="020B0609070205080204" pitchFamily="49" charset="-128"/>
-                <a:ea typeface="ＭＳ ゴシック" panose="020B0609070205080204" pitchFamily="49" charset="-128"/>
-              </a:rPr>
-              <a:t>基本的はコンポーネントごとの分析</a:t>
-            </a:r>
-            <a:endParaRPr lang="en-US" altLang="ja-JP" sz="2400" b="0" strike="noStrike" spc="-1" dirty="0" smtClean="0">
-              <a:solidFill>
-                <a:srgbClr val="000000"/>
-              </a:solidFill>
-              <a:latin typeface="ＭＳ ゴシック" panose="020B0609070205080204" pitchFamily="49" charset="-128"/>
-              <a:ea typeface="ＭＳ ゴシック" panose="020B0609070205080204" pitchFamily="49" charset="-128"/>
-            </a:endParaRPr>
-          </a:p>
-          <a:p>
-            <a:pPr marL="522360" lvl="2" indent="-381960">
-              <a:lnSpc>
-                <a:spcPct val="100000"/>
-              </a:lnSpc>
-              <a:buClr>
-                <a:srgbClr val="3C464B"/>
-              </a:buClr>
-              <a:buFont typeface="Noto Sans Symbols"/>
-              <a:buAutoNum type="alphaLcParenR"/>
-            </a:pPr>
-            <a:r>
-              <a:rPr lang="ja-JP" altLang="en-US" sz="2400" b="0" strike="noStrike" spc="-1" dirty="0" smtClean="0">
-                <a:solidFill>
-                  <a:srgbClr val="000000"/>
-                </a:solidFill>
-                <a:latin typeface="ＭＳ ゴシック" panose="020B0609070205080204" pitchFamily="49" charset="-128"/>
-                <a:ea typeface="ＭＳ ゴシック" panose="020B0609070205080204" pitchFamily="49" charset="-128"/>
-              </a:rPr>
-              <a:t>特定の使用例を考慮しない </a:t>
-            </a:r>
-            <a:r>
-              <a:rPr lang="en-US" altLang="ja-JP" sz="2400" b="0" strike="noStrike" spc="-1" dirty="0" smtClean="0">
-                <a:solidFill>
-                  <a:srgbClr val="000000"/>
-                </a:solidFill>
-                <a:latin typeface="ＭＳ ゴシック" panose="020B0609070205080204" pitchFamily="49" charset="-128"/>
-                <a:ea typeface="ＭＳ ゴシック" panose="020B0609070205080204" pitchFamily="49" charset="-128"/>
-              </a:rPr>
+              <a:rPr lang="ja-JP" altLang="en-US" sz="2400" dirty="0"/>
+              <a:t>コンポーネントによる分析 </a:t>
+            </a:r>
+            <a:r>
+              <a:rPr lang="en-US" altLang="ja-JP" sz="2400" dirty="0"/>
+              <a:t>vs. </a:t>
+            </a:r>
+            <a:r>
+              <a:rPr lang="ja-JP" altLang="en-US" sz="2400" dirty="0"/>
+              <a:t>ユースケースによる分析</a:t>
+            </a:r>
+            <a:br>
+              <a:rPr lang="ja-JP" altLang="en-US" sz="2400" dirty="0"/>
+            </a:br>
+            <a:r>
+              <a:rPr lang="en-US" altLang="ja-JP" dirty="0"/>
+              <a:t>a) </a:t>
+            </a:r>
+            <a:r>
+              <a:rPr lang="ja-JP" altLang="en-US" dirty="0"/>
+              <a:t>コンポーネント単位での解析</a:t>
+            </a:r>
+            <a:r>
+              <a:rPr lang="ja-JP" altLang="en-US" sz="2400" dirty="0"/>
+              <a:t/>
+            </a:r>
+            <a:br>
+              <a:rPr lang="ja-JP" altLang="en-US" sz="2400" dirty="0"/>
+            </a:br>
+            <a:r>
+              <a:rPr lang="en-US" altLang="ja-JP" dirty="0"/>
+              <a:t>b) </a:t>
+            </a:r>
+            <a:r>
+              <a:rPr lang="ja-JP" altLang="en-US" dirty="0"/>
+              <a:t>特定のユースケースのみを考慮すべきではない </a:t>
+            </a:r>
+            <a:r>
+              <a:rPr lang="en-US" altLang="ja-JP" dirty="0"/>
               <a:t>- </a:t>
             </a:r>
             <a:r>
-              <a:rPr lang="ja-JP" altLang="en-US" sz="2400" b="0" strike="noStrike" spc="-1" dirty="0" smtClean="0">
-                <a:solidFill>
-                  <a:srgbClr val="000000"/>
-                </a:solidFill>
-                <a:latin typeface="ＭＳ ゴシック" panose="020B0609070205080204" pitchFamily="49" charset="-128"/>
-                <a:ea typeface="ＭＳ ゴシック" panose="020B0609070205080204" pitchFamily="49" charset="-128"/>
-              </a:rPr>
-              <a:t>ライセンス分析の再利用を可能にする</a:t>
-            </a:r>
-            <a:endParaRPr lang="en-US" altLang="ja-JP" sz="2400" b="0" strike="noStrike" spc="-1" dirty="0" smtClean="0">
-              <a:solidFill>
-                <a:srgbClr val="000000"/>
-              </a:solidFill>
-              <a:latin typeface="ＭＳ ゴシック" panose="020B0609070205080204" pitchFamily="49" charset="-128"/>
-              <a:ea typeface="ＭＳ ゴシック" panose="020B0609070205080204" pitchFamily="49" charset="-128"/>
-            </a:endParaRPr>
-          </a:p>
-          <a:p>
-            <a:pPr marL="522360" lvl="2" indent="-381960">
-              <a:lnSpc>
-                <a:spcPct val="100000"/>
-              </a:lnSpc>
-              <a:buClr>
-                <a:srgbClr val="3C464B"/>
-              </a:buClr>
-              <a:buFont typeface="Noto Sans Symbols"/>
-              <a:buAutoNum type="alphaLcParenR"/>
-            </a:pPr>
-            <a:r>
-              <a:rPr lang="ja-JP" altLang="en-US" sz="2400" b="0" strike="noStrike" spc="-1" dirty="0" smtClean="0">
-                <a:solidFill>
-                  <a:srgbClr val="000000"/>
-                </a:solidFill>
-                <a:latin typeface="ＭＳ ゴシック" panose="020B0609070205080204" pitchFamily="49" charset="-128"/>
-                <a:ea typeface="ＭＳ ゴシック" panose="020B0609070205080204" pitchFamily="49" charset="-128"/>
-              </a:rPr>
-              <a:t>相反する利用法分析：含まれるすべてのコンポーネントについて考慮</a:t>
+              <a:rPr lang="ja-JP" altLang="en-US" dirty="0"/>
+              <a:t>それにより、ライセンス分析の結果を再利用できるようにする</a:t>
+            </a:r>
+            <a:r>
+              <a:rPr lang="ja-JP" altLang="en-US" sz="2400" dirty="0"/>
+              <a:t/>
+            </a:r>
+            <a:br>
+              <a:rPr lang="ja-JP" altLang="en-US" sz="2400" dirty="0"/>
+            </a:br>
+            <a:r>
+              <a:rPr lang="en-US" altLang="ja-JP" dirty="0"/>
+              <a:t>c) </a:t>
+            </a:r>
+            <a:r>
+              <a:rPr lang="ja-JP" altLang="en-US" dirty="0"/>
+              <a:t>ユースケースで分析するのではなく、含まれるすべてのコンポーネントについて考慮</a:t>
             </a:r>
             <a:endParaRPr lang="en-US" altLang="ja-JP" sz="2400" b="0" strike="noStrike" spc="-1" dirty="0" smtClean="0">
               <a:solidFill>
@@ -11508,7 +11533,7 @@
         </p:nvSpPr>
         <p:spPr>
           <a:xfrm>
-            <a:off x="7422840" y="1825560"/>
+            <a:off x="7946727" y="1882281"/>
             <a:ext cx="3930480" cy="3512160"/>
           </a:xfrm>
           <a:prstGeom prst="rect">
@@ -11542,7 +11567,7 @@
         </p:nvSpPr>
         <p:spPr>
           <a:xfrm>
-            <a:off x="7500135" y="2122919"/>
+            <a:off x="8109039" y="2192926"/>
             <a:ext cx="3935001" cy="2890869"/>
           </a:xfrm>
           <a:prstGeom prst="rect">
@@ -12121,16 +12146,26 @@
               <a:buAutoNum type="alphaLcParenR"/>
             </a:pPr>
             <a:r>
-              <a:rPr lang="ja-JP" altLang="en-US" sz="2300" b="0" strike="noStrike" spc="-1" dirty="0" smtClean="0">
+              <a:rPr lang="ja-JP" altLang="en-US" sz="2300" spc="-1" dirty="0">
                 <a:solidFill>
                   <a:srgbClr val="000000"/>
                 </a:solidFill>
                 <a:latin typeface="ＭＳ ゴシック" panose="020B0609070205080204" pitchFamily="49" charset="-128"/>
                 <a:ea typeface="ＭＳ ゴシック" panose="020B0609070205080204" pitchFamily="49" charset="-128"/>
               </a:rPr>
-              <a:t>明確なライセンス条項が必要な場合もある</a:t>
-            </a:r>
-            <a:endParaRPr lang="en-US" altLang="ja-JP" sz="2300" b="0" strike="noStrike" spc="-1" dirty="0" smtClean="0">
+              <a:t>ライセンス条件の明確化が必要な場合も</a:t>
+            </a:r>
+            <a:r>
+              <a:rPr lang="ja-JP" altLang="en-US" sz="2300" spc="-1" dirty="0" smtClean="0">
+                <a:solidFill>
+                  <a:srgbClr val="000000"/>
+                </a:solidFill>
+                <a:latin typeface="ＭＳ ゴシック" panose="020B0609070205080204" pitchFamily="49" charset="-128"/>
+                <a:ea typeface="ＭＳ ゴシック" panose="020B0609070205080204" pitchFamily="49" charset="-128"/>
+              </a:rPr>
+              <a:t>ある</a:t>
+            </a:r>
+            <a:endParaRPr lang="en-US" altLang="ja-JP" sz="2300" spc="-1" dirty="0" smtClean="0">
               <a:solidFill>
                 <a:srgbClr val="000000"/>
               </a:solidFill>
@@ -12155,7 +12190,7 @@
                 <a:latin typeface="ＭＳ ゴシック" panose="020B0609070205080204" pitchFamily="49" charset="-128"/>
                 <a:ea typeface="ＭＳ ゴシック" panose="020B0609070205080204" pitchFamily="49" charset="-128"/>
               </a:rPr>
-              <a:t>　例：新しいライセンス、</a:t>
+              <a:t>　例</a:t>
             </a:r>
             <a:r>
               <a:rPr lang="ja-JP" altLang="en-US" sz="2300" spc="-1" dirty="0">
@@ -12165,7 +12200,7 @@
                 <a:latin typeface="ＭＳ ゴシック" panose="020B0609070205080204" pitchFamily="49" charset="-128"/>
                 <a:ea typeface="ＭＳ ゴシック" panose="020B0609070205080204" pitchFamily="49" charset="-128"/>
               </a:rPr>
-              <a:t>珍</a:t>
+              <a:t>：新しいライセンス、珍しいライセンス、米国の法律に準拠して書かれたライセンスを欧州で使う場合</a:t>
             </a:r>
             <a:r>
               <a:rPr lang="ja-JP" altLang="en-US" sz="2300" spc="-1" dirty="0" smtClean="0">
@@ -12175,46 +12210,7 @@
                 <a:latin typeface="ＭＳ ゴシック" panose="020B0609070205080204" pitchFamily="49" charset="-128"/>
                 <a:ea typeface="ＭＳ ゴシック" panose="020B0609070205080204" pitchFamily="49" charset="-128"/>
               </a:rPr>
-              <a:t>しい</a:t>
-            </a:r>
-            <a:r>
-              <a:rPr lang="ja-JP" altLang="en-US" sz="2300" b="0" strike="noStrike" spc="-1" dirty="0" smtClean="0">
-                <a:solidFill>
-                  <a:srgbClr val="000000"/>
-                </a:solidFill>
-                <a:latin typeface="ＭＳ ゴシック" panose="020B0609070205080204" pitchFamily="49" charset="-128"/>
-                <a:ea typeface="ＭＳ ゴシック" panose="020B0609070205080204" pitchFamily="49" charset="-128"/>
-              </a:rPr>
-              <a:t>ライセンス、米国の法律のために書かれた</a:t>
-            </a:r>
-            <a:r>
-              <a:rPr lang="en-US" altLang="ja-JP" sz="2300" b="0" strike="noStrike" spc="-1" dirty="0" smtClean="0">
-                <a:solidFill>
-                  <a:srgbClr val="000000"/>
-                </a:solidFill>
-                <a:latin typeface="ＭＳ ゴシック" panose="020B0609070205080204" pitchFamily="49" charset="-128"/>
-                <a:ea typeface="ＭＳ ゴシック" panose="020B0609070205080204" pitchFamily="49" charset="-128"/>
-              </a:rPr>
-              <a:t/>
-            </a:r>
-            <a:br>
-              <a:rPr lang="en-US" altLang="ja-JP" sz="2300" b="0" strike="noStrike" spc="-1" dirty="0" smtClean="0">
-                <a:solidFill>
-                  <a:srgbClr val="000000"/>
-                </a:solidFill>
-                <a:latin typeface="ＭＳ ゴシック" panose="020B0609070205080204" pitchFamily="49" charset="-128"/>
-                <a:ea typeface="ＭＳ ゴシック" panose="020B0609070205080204" pitchFamily="49" charset="-128"/>
-              </a:rPr>
-            </a:br>
-            <a:r>
-              <a:rPr lang="ja-JP" altLang="en-US" sz="2300" b="0" strike="noStrike" spc="-1" dirty="0" smtClean="0">
-                <a:solidFill>
-                  <a:srgbClr val="000000"/>
-                </a:solidFill>
-                <a:latin typeface="ＭＳ ゴシック" panose="020B0609070205080204" pitchFamily="49" charset="-128"/>
-                <a:ea typeface="ＭＳ ゴシック" panose="020B0609070205080204" pitchFamily="49" charset="-128"/>
-              </a:rPr>
-              <a:t>　ライセンス、ヨーロッパで使用されるライセンスなど</a:t>
+              <a:t>など</a:t>
             </a:r>
             <a:endParaRPr lang="en-US" altLang="ja-JP" sz="2300" b="0" strike="noStrike" spc="-1" dirty="0" smtClean="0">
               <a:solidFill>
@@ -12256,17 +12252,7 @@
                 <a:latin typeface="ＭＳ ゴシック" panose="020B0609070205080204" pitchFamily="49" charset="-128"/>
                 <a:ea typeface="ＭＳ ゴシック" panose="020B0609070205080204" pitchFamily="49" charset="-128"/>
               </a:rPr>
-              <a:t>また</a:t>
-            </a:r>
-            <a:r>
-              <a:rPr lang="ja-JP" altLang="en-US" sz="2300" b="1" spc="-1" dirty="0">
-                <a:solidFill>
-                  <a:srgbClr val="000000"/>
-                </a:solidFill>
-                <a:latin typeface="ＭＳ ゴシック" panose="020B0609070205080204" pitchFamily="49" charset="-128"/>
-                <a:ea typeface="ＭＳ ゴシック" panose="020B0609070205080204" pitchFamily="49" charset="-128"/>
-              </a:rPr>
-              <a:t>は</a:t>
+              <a:t>または</a:t>
             </a:r>
             <a:r>
               <a:rPr lang="en-US" sz="2300" b="1" strike="noStrike" spc="-1" dirty="0" smtClean="0">
@@ -12312,7 +12298,17 @@
                 <a:latin typeface="ＭＳ ゴシック" panose="020B0609070205080204" pitchFamily="49" charset="-128"/>
                 <a:ea typeface="ＭＳ ゴシック" panose="020B0609070205080204" pitchFamily="49" charset="-128"/>
               </a:rPr>
-              <a:t>ライセンス分析を再利用するために</a:t>
+              <a:t>ライセンス</a:t>
+            </a:r>
+            <a:r>
+              <a:rPr lang="ja-JP" altLang="en-US" sz="2300" b="0" strike="noStrike" spc="-1" dirty="0" smtClean="0">
+                <a:solidFill>
+                  <a:srgbClr val="000000"/>
+                </a:solidFill>
+                <a:latin typeface="ＭＳ ゴシック" panose="020B0609070205080204" pitchFamily="49" charset="-128"/>
+                <a:ea typeface="ＭＳ ゴシック" panose="020B0609070205080204" pitchFamily="49" charset="-128"/>
+              </a:rPr>
+              <a:t>分析を再利用するために</a:t>
             </a:r>
             <a:r>
               <a:rPr lang="en-US" sz="2300" b="0" strike="noStrike" spc="-1" dirty="0" smtClean="0">
@@ -15032,44 +15028,14 @@
               <a:t>「</a:t>
             </a:r>
             <a:r>
-              <a:rPr lang="ja-JP" altLang="en-US" sz="2000" spc="-1" dirty="0" smtClean="0">
+              <a:rPr lang="ja-JP" altLang="en-US" sz="2000" spc="-1" dirty="0">
                 <a:solidFill>
                   <a:srgbClr val="000000"/>
                 </a:solidFill>
                 <a:latin typeface="Open Sans"/>
                 <a:ea typeface="Open Sans"/>
               </a:rPr>
-              <a:t>ライセンス</a:t>
-            </a:r>
-            <a:r>
-              <a:rPr lang="ja-JP" altLang="en-US" sz="2000" b="0" strike="noStrike" spc="-1" dirty="0" smtClean="0">
-                <a:solidFill>
-                  <a:srgbClr val="000000"/>
-                </a:solidFill>
-                <a:latin typeface="Open Sans"/>
-                <a:ea typeface="Open Sans"/>
-              </a:rPr>
-              <a:t>急増</a:t>
-            </a:r>
-            <a:r>
-              <a:rPr lang="ja-JP" altLang="en-US" sz="2000" spc="-1" dirty="0" smtClean="0">
-                <a:solidFill>
-                  <a:srgbClr val="000000"/>
-                </a:solidFill>
-                <a:latin typeface="Open Sans"/>
-                <a:ea typeface="Open Sans"/>
-              </a:rPr>
-              <a:t>中</a:t>
-            </a:r>
-            <a:r>
-              <a:rPr lang="ja-JP" altLang="en-US" sz="2000" spc="-1" dirty="0">
-                <a:solidFill>
-                  <a:srgbClr val="000000"/>
-                </a:solidFill>
-                <a:latin typeface="Open Sans"/>
-                <a:ea typeface="Open Sans"/>
-              </a:rPr>
-              <a:t>」</a:t>
+              <a:t>ライセンスの氾濫」</a:t>
             </a:r>
             <a:r>
               <a:rPr lang="en-US" sz="2000" b="0" strike="noStrike" spc="-1" dirty="0" smtClean="0">
@@ -16237,6 +16203,151 @@
           </a:p>
         </p:txBody>
       </p:sp>
+      <p:sp>
+        <p:nvSpPr>
+          <p:cNvPr id="4" name="CustomShape 3"/>
+          <p:cNvSpPr/>
+          <p:nvPr/>
+        </p:nvSpPr>
+        <p:spPr>
+          <a:xfrm>
+            <a:off x="8046720" y="1825560"/>
+            <a:ext cx="3565800" cy="3569040"/>
+          </a:xfrm>
+          <a:prstGeom prst="rect">
+            <a:avLst/>
+          </a:prstGeom>
+          <a:solidFill>
+            <a:srgbClr val="F2F2F2"/>
+          </a:solidFill>
+          <a:ln>
+            <a:noFill/>
+          </a:ln>
+        </p:spPr>
+        <p:style>
+          <a:lnRef idx="0">
+            <a:scrgbClr r="0" g="0" b="0"/>
+          </a:lnRef>
+          <a:fillRef idx="0">
+            <a:scrgbClr r="0" g="0" b="0"/>
+          </a:fillRef>
+          <a:effectRef idx="0">
+            <a:scrgbClr r="0" g="0" b="0"/>
+          </a:effectRef>
+          <a:fontRef idx="minor"/>
+        </p:style>
+      </p:sp>
+      <p:sp>
+        <p:nvSpPr>
+          <p:cNvPr id="5" name="CustomShape 4"/>
+          <p:cNvSpPr/>
+          <p:nvPr/>
+        </p:nvSpPr>
+        <p:spPr>
+          <a:xfrm rot="21577800">
+            <a:off x="8148231" y="2131196"/>
+            <a:ext cx="3108600" cy="3146155"/>
+          </a:xfrm>
+          <a:prstGeom prst="rect">
+            <a:avLst/>
+          </a:prstGeom>
+          <a:noFill/>
+          <a:ln>
+            <a:noFill/>
+          </a:ln>
+        </p:spPr>
+        <p:style>
+          <a:lnRef idx="0">
+            <a:scrgbClr r="0" g="0" b="0"/>
+          </a:lnRef>
+          <a:fillRef idx="0">
+            <a:scrgbClr r="0" g="0" b="0"/>
+          </a:fillRef>
+          <a:effectRef idx="0">
+            <a:scrgbClr r="0" g="0" b="0"/>
+          </a:effectRef>
+          <a:fontRef idx="minor"/>
+        </p:style>
+        <p:txBody>
+          <a:bodyPr lIns="90000" tIns="45000" rIns="90000" bIns="45000">
+            <a:noAutofit/>
+          </a:bodyPr>
+          <a:lstStyle/>
+          <a:p>
+            <a:pPr marL="171360" indent="-169920">
+              <a:lnSpc>
+                <a:spcPct val="100000"/>
+              </a:lnSpc>
+            </a:pPr>
+            <a:r>
+              <a:rPr lang="ja-JP" altLang="en-US" dirty="0"/>
+              <a:t>もっと知りたい人は</a:t>
+            </a:r>
+            <a:r>
+              <a:rPr lang="en-US" sz="1800" b="1" strike="noStrike" spc="-1" dirty="0" smtClean="0">
+                <a:solidFill>
+                  <a:srgbClr val="000000"/>
+                </a:solidFill>
+                <a:latin typeface="Arial"/>
+                <a:ea typeface="Arial"/>
+              </a:rPr>
+              <a:t>:</a:t>
+            </a:r>
+            <a:endParaRPr lang="en-US" sz="1800" b="0" strike="noStrike" spc="-1" dirty="0">
+              <a:latin typeface="Arial"/>
+            </a:endParaRPr>
+          </a:p>
+          <a:p>
+            <a:pPr marL="171360" indent="-182520">
+              <a:lnSpc>
+                <a:spcPct val="100000"/>
+              </a:lnSpc>
+              <a:spcBef>
+                <a:spcPts val="1001"/>
+              </a:spcBef>
+              <a:buClr>
+                <a:srgbClr val="879BAA"/>
+              </a:buClr>
+              <a:buFont typeface="Arial"/>
+              <a:buChar char="•"/>
+            </a:pPr>
+            <a:r>
+              <a:rPr lang="en-US" altLang="ja-JP" dirty="0"/>
+              <a:t>Open Source Automation Development Lab (OSADL) </a:t>
+            </a:r>
+            <a:r>
+              <a:rPr lang="ja-JP" altLang="en-US" dirty="0"/>
+              <a:t>が、さまざまなライセンスの義務条件データを公開しています。</a:t>
+            </a:r>
+            <a:r>
+              <a:rPr lang="en-US" altLang="ja-JP" dirty="0">
+                <a:hlinkClick r:id="rId2"/>
+              </a:rPr>
+              <a:t>https://www.osadl.org/Access-to-raw-data.oss-compliance-raw-data-access.0.html</a:t>
+            </a:r>
+            <a:r>
+              <a:rPr dirty="0"/>
+              <a:t/>
+            </a:r>
+            <a:br>
+              <a:rPr dirty="0"/>
+            </a:br>
+            <a:r>
+              <a:rPr lang="en-US" sz="1800" b="0" strike="noStrike" spc="-1" dirty="0">
+                <a:solidFill>
+                  <a:srgbClr val="000000"/>
+                </a:solidFill>
+                <a:latin typeface="Arial"/>
+                <a:ea typeface="DejaVu Sans"/>
+              </a:rPr>
+              <a:t> </a:t>
+            </a:r>
+            <a:endParaRPr lang="en-US" sz="1800" b="0" strike="noStrike" spc="-1" dirty="0">
+              <a:latin typeface="Arial"/>
+            </a:endParaRPr>
+          </a:p>
+        </p:txBody>
+      </p:sp>
     </p:spTree>
   </p:cSld>
   <p:clrMapOvr>
@@ -18130,44 +18241,49 @@
               <a:buChar char="•"/>
             </a:pPr>
             <a:r>
-              <a:rPr lang="ja-JP" altLang="en-US" i="1" spc="-1" dirty="0" smtClean="0">
-                <a:solidFill>
-                  <a:srgbClr val="000000"/>
-                </a:solidFill>
-                <a:latin typeface="Arial"/>
+              <a:rPr lang="ja-JP" altLang="en-US" i="1" spc="-1" dirty="0">
+                <a:solidFill>
+                  <a:srgbClr val="000000"/>
+                </a:solidFill>
                 <a:ea typeface="Arial"/>
               </a:rPr>
-              <a:t>面白おかしくしようとしたもの（または政治的な声明を主張したもの</a:t>
-            </a:r>
-            <a:r>
-              <a:rPr lang="en-US" altLang="ja-JP" i="1" spc="-1" dirty="0" smtClean="0">
-                <a:solidFill>
-                  <a:srgbClr val="000000"/>
-                </a:solidFill>
-                <a:latin typeface="Arial"/>
+              <a:t>面白さを狙って </a:t>
+            </a:r>
+            <a:r>
+              <a:rPr lang="en-US" altLang="ja-JP" i="1" spc="-1" dirty="0">
+                <a:solidFill>
+                  <a:srgbClr val="000000"/>
+                </a:solidFill>
                 <a:ea typeface="Arial"/>
               </a:rPr>
-              <a:t>)</a:t>
-            </a:r>
-            <a:r>
-              <a:rPr lang="ja-JP" altLang="en-US" i="1" spc="-1" dirty="0" smtClean="0">
-                <a:solidFill>
-                  <a:srgbClr val="000000"/>
-                </a:solidFill>
-                <a:latin typeface="Arial"/>
+              <a:t>(</a:t>
+            </a:r>
+            <a:r>
+              <a:rPr lang="ja-JP" altLang="en-US" i="1" spc="-1" dirty="0">
+                <a:solidFill>
+                  <a:srgbClr val="000000"/>
+                </a:solidFill>
                 <a:ea typeface="Arial"/>
               </a:rPr>
-              <a:t>はライセンス分析が難しい</a:t>
+              <a:t>あるいは政治的な主張を</a:t>
+            </a:r>
+            <a:r>
+              <a:rPr lang="en-US" altLang="ja-JP" i="1" spc="-1" dirty="0">
+                <a:solidFill>
+                  <a:srgbClr val="000000"/>
+                </a:solidFill>
+                <a:ea typeface="Arial"/>
+              </a:rPr>
+              <a:t>) </a:t>
             </a:r>
             <a:r>
               <a:rPr lang="ja-JP" altLang="en-US" i="1" spc="-1" dirty="0">
                 <a:solidFill>
                   <a:srgbClr val="000000"/>
                 </a:solidFill>
-                <a:latin typeface="Arial"/>
                 <a:ea typeface="Arial"/>
               </a:rPr>
-              <a:t>。</a:t>
+              <a:t>書かれたものは、ライセンス解析には厄介。</a:t>
             </a:r>
             <a:endParaRPr lang="en-US" sz="1800" b="0" i="1" strike="noStrike" spc="-1" dirty="0" smtClean="0">
               <a:solidFill>
@@ -18196,51 +18312,11 @@
                 <a:solidFill>
                   <a:srgbClr val="000000"/>
                 </a:solidFill>
-                <a:latin typeface="Arial"/>
                 <a:ea typeface="Arial"/>
               </a:rPr>
-              <a:t>問</a:t>
-            </a:r>
-            <a:r>
-              <a:rPr lang="en-US" sz="1800" b="0" i="1" strike="noStrike" spc="-1" dirty="0" smtClean="0">
-                <a:solidFill>
-                  <a:srgbClr val="000000"/>
-                </a:solidFill>
-                <a:latin typeface="Arial"/>
-                <a:ea typeface="Arial"/>
-              </a:rPr>
-              <a:t>: [</a:t>
-            </a:r>
-            <a:r>
-              <a:rPr lang="en-US" altLang="ja-JP" i="1" spc="-1" dirty="0" err="1">
-                <a:solidFill>
-                  <a:srgbClr val="000000"/>
-                </a:solidFill>
-                <a:ea typeface="Arial"/>
-              </a:rPr>
-              <a:t>parafernalia</a:t>
-            </a:r>
-            <a:r>
-              <a:rPr lang="en-US" sz="1800" b="0" i="1" strike="noStrike" spc="-1" dirty="0" smtClean="0">
-                <a:solidFill>
-                  <a:srgbClr val="000000"/>
-                </a:solidFill>
-                <a:latin typeface="Arial"/>
-                <a:ea typeface="Arial"/>
-              </a:rPr>
-              <a:t>]  </a:t>
-            </a:r>
-            <a:r>
-              <a:rPr lang="ja-JP" altLang="en-US" sz="1800" b="0" i="1" strike="noStrike" spc="-1" dirty="0" smtClean="0">
-                <a:solidFill>
-                  <a:srgbClr val="000000"/>
-                </a:solidFill>
-                <a:latin typeface="Arial"/>
-                <a:ea typeface="Arial"/>
-              </a:rPr>
-              <a:t>についての所有権は無視できるのか、あるいは由来を確認するべきなのか？</a:t>
-            </a:r>
-            <a:endParaRPr lang="en-US" sz="1800" b="0" i="1" strike="noStrike" spc="-1" dirty="0" smtClean="0">
+              <a:t>質問：これは無視して良いでしょうか、それとも、著作者はそのようなグッズの所有をチェックするのでしょうか？</a:t>
+            </a:r>
+            <a:endParaRPr lang="en-US" i="1" spc="-1" dirty="0">
               <a:solidFill>
                 <a:srgbClr val="000000"/>
               </a:solidFill>
@@ -18249,7 +18325,7 @@
             </a:endParaRPr>
           </a:p>
           <a:p>
-            <a:pPr marL="171360" indent="-183240">
+            <a:pPr>
               <a:lnSpc>
                 <a:spcPct val="100000"/>
               </a:lnSpc>
@@ -18259,35 +18335,60 @@
               <a:buClr>
                 <a:srgbClr val="000000"/>
               </a:buClr>
-              <a:buFont typeface="Arial"/>
-              <a:buChar char="•"/>
             </a:pPr>
             <a:endParaRPr lang="en-US" i="1" spc="-1" dirty="0">
               <a:solidFill>
                 <a:srgbClr val="000000"/>
               </a:solidFill>
               <a:latin typeface="Arial"/>
-              <a:ea typeface="Arial"/>
-            </a:endParaRPr>
-          </a:p>
-          <a:p>
-            <a:pPr>
-              <a:lnSpc>
-                <a:spcPct val="100000"/>
-              </a:lnSpc>
-              <a:spcBef>
-                <a:spcPts val="1001"/>
-              </a:spcBef>
-              <a:buClr>
-                <a:srgbClr val="000000"/>
-              </a:buClr>
-            </a:pPr>
-            <a:endParaRPr lang="en-US" i="1" spc="-1" dirty="0">
-              <a:solidFill>
-                <a:srgbClr val="000000"/>
-              </a:solidFill>
-              <a:latin typeface="Arial"/>
-            </a:endParaRPr>
+            </a:endParaRPr>
+          </a:p>
+        </p:txBody>
+      </p:sp>
+      <p:sp>
+        <p:nvSpPr>
+          <p:cNvPr id="2" name="テキスト ボックス 1"/>
+          <p:cNvSpPr txBox="1"/>
+          <p:nvPr/>
+        </p:nvSpPr>
+        <p:spPr>
+          <a:xfrm>
+            <a:off x="8609351" y="1623095"/>
+            <a:ext cx="3112957" cy="923330"/>
+          </a:xfrm>
+          <a:prstGeom prst="rect">
+            <a:avLst/>
+          </a:prstGeom>
+        </p:spPr>
+        <p:style>
+          <a:lnRef idx="2">
+            <a:schemeClr val="dk1"/>
+          </a:lnRef>
+          <a:fillRef idx="1">
+            <a:schemeClr val="lt1"/>
+          </a:fillRef>
+          <a:effectRef idx="0">
+            <a:schemeClr val="dk1"/>
+          </a:effectRef>
+          <a:fontRef idx="minor">
+            <a:schemeClr val="dk1"/>
+          </a:fontRef>
+        </p:style>
+        <p:txBody>
+          <a:bodyPr wrap="square" rtlCol="0">
+            <a:spAutoFit/>
+          </a:bodyPr>
+          <a:lstStyle/>
+          <a:p>
+            <a:r>
+              <a:rPr lang="ja-JP" altLang="en-US" dirty="0" smtClean="0"/>
+              <a:t>訳注：この</a:t>
+            </a:r>
+            <a:r>
+              <a:rPr lang="ja-JP" altLang="en-US" dirty="0"/>
+              <a:t>例では、チェ・ゲバラのグッズを持っている人の使用を禁止すると書いてある</a:t>
+            </a:r>
+            <a:endParaRPr kumimoji="1" lang="ja-JP" altLang="en-US" dirty="0"/>
           </a:p>
         </p:txBody>
       </p:sp>
@@ -18691,24 +18792,18 @@
               <a:buChar char="•"/>
             </a:pPr>
             <a:r>
-              <a:rPr lang="ja-JP" altLang="en-US" spc="-1" dirty="0" smtClean="0">
+              <a:rPr lang="ja-JP" altLang="en-US" dirty="0"/>
+              <a:t>レビューが必要な、極めて特別な例である</a:t>
+            </a:r>
+            <a:r>
+              <a:rPr lang="ja-JP" altLang="en-US" sz="1800" b="0" strike="noStrike" spc="-1" dirty="0" smtClean="0">
                 <a:solidFill>
                   <a:srgbClr val="000000"/>
                 </a:solidFill>
                 <a:latin typeface="Arial"/>
                 <a:ea typeface="Arial"/>
               </a:rPr>
-              <a:t>特別な</a:t>
-            </a:r>
-            <a:r>
-              <a:rPr lang="ja-JP" altLang="en-US" sz="1800" b="0" strike="noStrike" spc="-1" dirty="0" smtClean="0">
-                <a:solidFill>
-                  <a:srgbClr val="000000"/>
-                </a:solidFill>
-                <a:latin typeface="Arial"/>
-                <a:ea typeface="Arial"/>
-              </a:rPr>
-              <a:t>場合においては再レビューが必要となる。</a:t>
+              <a:t>。</a:t>
             </a:r>
             <a:endParaRPr lang="en-US" sz="1800" b="0" strike="noStrike" spc="-1" dirty="0" smtClean="0">
               <a:solidFill>

</xml_diff>